<commit_message>
Prezentace pridan slajd dokumntace, komentare
</commit_message>
<xml_diff>
--- a/prezentace.pptx
+++ b/prezentace.pptx
@@ -5,7 +5,7 @@
     <p:sldMasterId id="2147483660" r:id="rId1"/>
   </p:sldMasterIdLst>
   <p:notesMasterIdLst>
-    <p:notesMasterId r:id="rId23"/>
+    <p:notesMasterId r:id="rId24"/>
   </p:notesMasterIdLst>
   <p:sldIdLst>
     <p:sldId id="256" r:id="rId2"/>
@@ -27,8 +27,9 @@
     <p:sldId id="278" r:id="rId18"/>
     <p:sldId id="279" r:id="rId19"/>
     <p:sldId id="280" r:id="rId20"/>
-    <p:sldId id="267" r:id="rId21"/>
-    <p:sldId id="283" r:id="rId22"/>
+    <p:sldId id="284" r:id="rId21"/>
+    <p:sldId id="267" r:id="rId22"/>
+    <p:sldId id="283" r:id="rId23"/>
   </p:sldIdLst>
   <p:sldSz cx="9144000" cy="6858000" type="screen4x3"/>
   <p:notesSz cx="6858000" cy="9144000"/>
@@ -129,7 +130,7 @@
   </p:defaultTextStyle>
   <p:extLst>
     <p:ext uri="{EFAFB233-063F-42B5-8137-9DF3F51BA10A}">
-      <p15:sldGuideLst xmlns:p15="http://schemas.microsoft.com/office/powerpoint/2012/main" xmlns="">
+      <p15:sldGuideLst xmlns="" xmlns:p15="http://schemas.microsoft.com/office/powerpoint/2012/main">
         <p15:guide id="1" orient="horz" pos="2160">
           <p15:clr>
             <a:srgbClr val="A4A3A4"/>
@@ -400,7 +401,7 @@
     </p:spTree>
     <p:extLst>
       <p:ext uri="{BB962C8B-B14F-4D97-AF65-F5344CB8AC3E}">
-        <p14:creationId xmlns:p14="http://schemas.microsoft.com/office/powerpoint/2010/main" xmlns="" val="47929628"/>
+        <p14:creationId xmlns="" xmlns:p14="http://schemas.microsoft.com/office/powerpoint/2010/main" val="47929628"/>
       </p:ext>
     </p:extLst>
   </p:cSld>
@@ -4541,7 +4542,7 @@
     </p:spTree>
     <p:extLst>
       <p:ext uri="{BB962C8B-B14F-4D97-AF65-F5344CB8AC3E}">
-        <p14:creationId xmlns:p14="http://schemas.microsoft.com/office/powerpoint/2010/main" xmlns="" val="1300225353"/>
+        <p14:creationId xmlns="" xmlns:p14="http://schemas.microsoft.com/office/powerpoint/2010/main" val="1300225353"/>
       </p:ext>
     </p:extLst>
   </p:cSld>
@@ -4745,7 +4746,7 @@
     </p:spTree>
     <p:extLst>
       <p:ext uri="{BB962C8B-B14F-4D97-AF65-F5344CB8AC3E}">
-        <p14:creationId xmlns:p14="http://schemas.microsoft.com/office/powerpoint/2010/main" xmlns="" val="4191602611"/>
+        <p14:creationId xmlns="" xmlns:p14="http://schemas.microsoft.com/office/powerpoint/2010/main" val="4191602611"/>
       </p:ext>
     </p:extLst>
   </p:cSld>
@@ -6041,11 +6042,7 @@
             </a:pPr>
             <a:r>
               <a:rPr lang="cs-CZ" dirty="0" smtClean="0"/>
-              <a:t>Jiří </a:t>
-            </a:r>
-            <a:r>
-              <a:rPr lang="cs-CZ" dirty="0" smtClean="0"/>
-              <a:t>Vrbka</a:t>
+              <a:t>Jiří Vrbka</a:t>
             </a:r>
           </a:p>
           <a:p>
@@ -6151,6 +6148,189 @@
           <a:p>
             <a:r>
               <a:rPr lang="cs-CZ" dirty="0" smtClean="0"/>
+              <a:t>Dokumentace</a:t>
+            </a:r>
+            <a:endParaRPr lang="cs-CZ" dirty="0"/>
+          </a:p>
+        </p:txBody>
+      </p:sp>
+      <p:sp>
+        <p:nvSpPr>
+          <p:cNvPr id="3" name="Zástupný symbol pro obsah 2"/>
+          <p:cNvSpPr>
+            <a:spLocks noGrp="1"/>
+          </p:cNvSpPr>
+          <p:nvPr>
+            <p:ph idx="1"/>
+          </p:nvPr>
+        </p:nvSpPr>
+        <p:spPr>
+          <a:xfrm>
+            <a:off x="457200" y="1775191"/>
+            <a:ext cx="8686800" cy="4625609"/>
+          </a:xfrm>
+        </p:spPr>
+        <p:txBody>
+          <a:bodyPr/>
+          <a:lstStyle/>
+          <a:p>
+            <a:r>
+              <a:rPr lang="cs-CZ" dirty="0" smtClean="0"/>
+              <a:t>Kód dokumentován pomocí C# </a:t>
+            </a:r>
+            <a:r>
+              <a:rPr lang="cs-CZ" dirty="0" err="1" smtClean="0"/>
+              <a:t>xml</a:t>
+            </a:r>
+            <a:r>
+              <a:rPr lang="cs-CZ" dirty="0" smtClean="0"/>
+              <a:t> komentářů</a:t>
+            </a:r>
+          </a:p>
+          <a:p>
+            <a:pPr lvl="1"/>
+            <a:endParaRPr lang="cs-CZ" dirty="0" smtClean="0"/>
+          </a:p>
+        </p:txBody>
+      </p:sp>
+      <p:sp>
+        <p:nvSpPr>
+          <p:cNvPr id="4" name="Zástupný symbol pro zápatí 3"/>
+          <p:cNvSpPr>
+            <a:spLocks noGrp="1"/>
+          </p:cNvSpPr>
+          <p:nvPr>
+            <p:ph type="ftr" sz="quarter" idx="11"/>
+          </p:nvPr>
+        </p:nvSpPr>
+        <p:spPr/>
+        <p:txBody>
+          <a:bodyPr/>
+          <a:lstStyle/>
+          <a:p>
+            <a:r>
+              <a:rPr lang="cs-CZ" smtClean="0"/>
+              <a:t>Bc. Michael Rádl, Jakub Matuška, Lukáš Findura, Jiří Vrbka </a:t>
+            </a:r>
+            <a:endParaRPr lang="cs-CZ"/>
+          </a:p>
+        </p:txBody>
+      </p:sp>
+      <p:pic>
+        <p:nvPicPr>
+          <p:cNvPr id="1026" name="Picture 2"/>
+          <p:cNvPicPr>
+            <a:picLocks noChangeAspect="1" noChangeArrowheads="1"/>
+          </p:cNvPicPr>
+          <p:nvPr/>
+        </p:nvPicPr>
+        <p:blipFill>
+          <a:blip r:embed="rId2"/>
+          <a:srcRect/>
+          <a:stretch>
+            <a:fillRect/>
+          </a:stretch>
+        </p:blipFill>
+        <p:spPr bwMode="auto">
+          <a:xfrm>
+            <a:off x="1643042" y="2428868"/>
+            <a:ext cx="5991225" cy="1895475"/>
+          </a:xfrm>
+          <a:prstGeom prst="rect">
+            <a:avLst/>
+          </a:prstGeom>
+          <a:noFill/>
+          <a:ln w="9525">
+            <a:noFill/>
+            <a:miter lim="800000"/>
+            <a:headEnd/>
+            <a:tailEnd/>
+          </a:ln>
+          <a:effectLst/>
+        </p:spPr>
+      </p:pic>
+      <p:pic>
+        <p:nvPicPr>
+          <p:cNvPr id="1027" name="Picture 3"/>
+          <p:cNvPicPr>
+            <a:picLocks noChangeAspect="1" noChangeArrowheads="1"/>
+          </p:cNvPicPr>
+          <p:nvPr/>
+        </p:nvPicPr>
+        <p:blipFill>
+          <a:blip r:embed="rId3"/>
+          <a:srcRect/>
+          <a:stretch>
+            <a:fillRect/>
+          </a:stretch>
+        </p:blipFill>
+        <p:spPr bwMode="auto">
+          <a:xfrm>
+            <a:off x="1214414" y="4572008"/>
+            <a:ext cx="7019925" cy="1695450"/>
+          </a:xfrm>
+          <a:prstGeom prst="rect">
+            <a:avLst/>
+          </a:prstGeom>
+          <a:noFill/>
+          <a:ln w="9525">
+            <a:noFill/>
+            <a:miter lim="800000"/>
+            <a:headEnd/>
+            <a:tailEnd/>
+          </a:ln>
+          <a:effectLst/>
+        </p:spPr>
+      </p:pic>
+    </p:spTree>
+  </p:cSld>
+  <p:clrMapOvr>
+    <a:masterClrMapping/>
+  </p:clrMapOvr>
+  <p:timing>
+    <p:tnLst>
+      <p:par>
+        <p:cTn id="1" dur="indefinite" restart="never" nodeType="tmRoot"/>
+      </p:par>
+    </p:tnLst>
+  </p:timing>
+</p:sld>
+</file>
+
+<file path=ppt/slides/slide21.xml><?xml version="1.0" encoding="utf-8"?>
+<p:sld xmlns:a="http://schemas.openxmlformats.org/drawingml/2006/main" xmlns:r="http://schemas.openxmlformats.org/officeDocument/2006/relationships" xmlns:p="http://schemas.openxmlformats.org/presentationml/2006/main">
+  <p:cSld>
+    <p:spTree>
+      <p:nvGrpSpPr>
+        <p:cNvPr id="1" name=""/>
+        <p:cNvGrpSpPr/>
+        <p:nvPr/>
+      </p:nvGrpSpPr>
+      <p:grpSpPr>
+        <a:xfrm>
+          <a:off x="0" y="0"/>
+          <a:ext cx="0" cy="0"/>
+          <a:chOff x="0" y="0"/>
+          <a:chExt cx="0" cy="0"/>
+        </a:xfrm>
+      </p:grpSpPr>
+      <p:sp>
+        <p:nvSpPr>
+          <p:cNvPr id="2" name="Nadpis 1"/>
+          <p:cNvSpPr>
+            <a:spLocks noGrp="1"/>
+          </p:cNvSpPr>
+          <p:nvPr>
+            <p:ph type="title"/>
+          </p:nvPr>
+        </p:nvSpPr>
+        <p:spPr/>
+        <p:txBody>
+          <a:bodyPr/>
+          <a:lstStyle/>
+          <a:p>
+            <a:r>
+              <a:rPr lang="cs-CZ" dirty="0" smtClean="0"/>
               <a:t>Poděkování</a:t>
             </a:r>
             <a:endParaRPr lang="cs-CZ" dirty="0"/>
@@ -6219,7 +6399,7 @@
 </p:sld>
 </file>
 
-<file path=ppt/slides/slide21.xml><?xml version="1.0" encoding="utf-8"?>
+<file path=ppt/slides/slide22.xml><?xml version="1.0" encoding="utf-8"?>
 <p:sld xmlns:a="http://schemas.openxmlformats.org/drawingml/2006/main" xmlns:r="http://schemas.openxmlformats.org/officeDocument/2006/relationships" xmlns:p="http://schemas.openxmlformats.org/presentationml/2006/main">
   <p:cSld>
     <p:spTree>

</xml_diff>